<commit_message>
Moved final pptx to other directory.
</commit_message>
<xml_diff>
--- a/other/Group2_Phase3_final.pptx
+++ b/other/Group2_Phase3_final.pptx
@@ -2921,7 +2921,7 @@
           <a:effectLst/>
           <a:extLst>
             <a:ext uri="{91240B29-F687-4f45-9708-019B960494DF}">
-              <a14:hiddenLine xmlns="" xmlns:a14="http://schemas.microsoft.com/office/drawing/2010/main" w="9525">
+              <a14:hiddenLine xmlns:a14="http://schemas.microsoft.com/office/drawing/2010/main" xmlns="" w="9525">
                 <a:solidFill>
                   <a:srgbClr val="000000"/>
                 </a:solidFill>
@@ -4443,7 +4443,7 @@
           <a:ln/>
           <a:extLst>
             <a:ext uri="{91240B29-F687-4f45-9708-019B960494DF}">
-              <a14:hiddenLine xmlns="" xmlns:a14="http://schemas.microsoft.com/office/drawing/2010/main" w="9525">
+              <a14:hiddenLine xmlns:a14="http://schemas.microsoft.com/office/drawing/2010/main" xmlns="" w="9525">
                 <a:solidFill>
                   <a:srgbClr val="000000"/>
                 </a:solidFill>
@@ -4718,7 +4718,7 @@
           <a:ln/>
           <a:extLst>
             <a:ext uri="{91240B29-F687-4f45-9708-019B960494DF}">
-              <a14:hiddenLine xmlns="" xmlns:a14="http://schemas.microsoft.com/office/drawing/2010/main" w="9525">
+              <a14:hiddenLine xmlns:a14="http://schemas.microsoft.com/office/drawing/2010/main" xmlns="" w="9525">
                 <a:solidFill>
                   <a:srgbClr val="000000"/>
                 </a:solidFill>
@@ -5001,7 +5001,7 @@
           <a:ln/>
           <a:extLst>
             <a:ext uri="{91240B29-F687-4f45-9708-019B960494DF}">
-              <a14:hiddenLine xmlns="" xmlns:a14="http://schemas.microsoft.com/office/drawing/2010/main" w="9525">
+              <a14:hiddenLine xmlns:a14="http://schemas.microsoft.com/office/drawing/2010/main" xmlns="" w="9525">
                 <a:solidFill>
                   <a:srgbClr val="000000"/>
                 </a:solidFill>
@@ -5627,7 +5627,7 @@
           <a:ln/>
           <a:extLst>
             <a:ext uri="{91240B29-F687-4f45-9708-019B960494DF}">
-              <a14:hiddenLine xmlns="" xmlns:a14="http://schemas.microsoft.com/office/drawing/2010/main" w="9525">
+              <a14:hiddenLine xmlns:a14="http://schemas.microsoft.com/office/drawing/2010/main" xmlns="" w="9525">
                 <a:solidFill>
                   <a:srgbClr val="000000"/>
                 </a:solidFill>
@@ -5966,7 +5966,7 @@
           <a:ln/>
           <a:extLst>
             <a:ext uri="{91240B29-F687-4f45-9708-019B960494DF}">
-              <a14:hiddenLine xmlns="" xmlns:a14="http://schemas.microsoft.com/office/drawing/2010/main" w="9525">
+              <a14:hiddenLine xmlns:a14="http://schemas.microsoft.com/office/drawing/2010/main" xmlns="" w="9525">
                 <a:solidFill>
                   <a:srgbClr val="000000"/>
                 </a:solidFill>
@@ -6443,7 +6443,7 @@
           <a:ln/>
           <a:extLst>
             <a:ext uri="{91240B29-F687-4f45-9708-019B960494DF}">
-              <a14:hiddenLine xmlns="" xmlns:a14="http://schemas.microsoft.com/office/drawing/2010/main" w="9525">
+              <a14:hiddenLine xmlns:a14="http://schemas.microsoft.com/office/drawing/2010/main" xmlns="" w="9525">
                 <a:solidFill>
                   <a:srgbClr val="000000"/>
                 </a:solidFill>
@@ -6872,7 +6872,7 @@
           <a:ln/>
           <a:extLst>
             <a:ext uri="{91240B29-F687-4f45-9708-019B960494DF}">
-              <a14:hiddenLine xmlns="" xmlns:a14="http://schemas.microsoft.com/office/drawing/2010/main" w="9525">
+              <a14:hiddenLine xmlns:a14="http://schemas.microsoft.com/office/drawing/2010/main" xmlns="" w="9525">
                 <a:solidFill>
                   <a:srgbClr val="000000"/>
                 </a:solidFill>
@@ -8809,6 +8809,120 @@
           </a:p>
         </p:txBody>
       </p:sp>
+      <p:sp>
+        <p:nvSpPr>
+          <p:cNvPr id="3" name="TextBox 2">
+            <a:extLst>
+              <a:ext uri="{FF2B5EF4-FFF2-40B4-BE49-F238E27FC236}">
+                <a16:creationId xmlns:a16="http://schemas.microsoft.com/office/drawing/2014/main" id="{CBE7C39D-9967-8F4C-A18F-C0E1B6C900EE}"/>
+              </a:ext>
+            </a:extLst>
+          </p:cNvPr>
+          <p:cNvSpPr txBox="1"/>
+          <p:nvPr/>
+        </p:nvSpPr>
+        <p:spPr>
+          <a:xfrm>
+            <a:off x="1333500" y="2565400"/>
+            <a:ext cx="184731" cy="369332"/>
+          </a:xfrm>
+          <a:prstGeom prst="rect">
+            <a:avLst/>
+          </a:prstGeom>
+          <a:noFill/>
+        </p:spPr>
+        <p:txBody>
+          <a:bodyPr wrap="none" rtlCol="0">
+            <a:spAutoFit/>
+          </a:bodyPr>
+          <a:lstStyle/>
+          <a:p>
+            <a:endParaRPr lang="en-US" dirty="0"/>
+          </a:p>
+        </p:txBody>
+      </p:sp>
+      <p:sp>
+        <p:nvSpPr>
+          <p:cNvPr id="4" name="TextBox 3">
+            <a:extLst>
+              <a:ext uri="{FF2B5EF4-FFF2-40B4-BE49-F238E27FC236}">
+                <a16:creationId xmlns:a16="http://schemas.microsoft.com/office/drawing/2014/main" id="{3F677550-E2C5-5C47-A22A-CE1B59A3388D}"/>
+              </a:ext>
+            </a:extLst>
+          </p:cNvPr>
+          <p:cNvSpPr txBox="1"/>
+          <p:nvPr/>
+        </p:nvSpPr>
+        <p:spPr>
+          <a:xfrm>
+            <a:off x="1054100" y="2425700"/>
+            <a:ext cx="10210800" cy="3693319"/>
+          </a:xfrm>
+          <a:prstGeom prst="rect">
+            <a:avLst/>
+          </a:prstGeom>
+          <a:noFill/>
+        </p:spPr>
+        <p:txBody>
+          <a:bodyPr wrap="square" rtlCol="0">
+            <a:spAutoFit/>
+          </a:bodyPr>
+          <a:lstStyle/>
+          <a:p>
+            <a:r>
+              <a:rPr lang="en-US" dirty="0"/>
+              <a:t>The purpose of this project is to use various Python and machine learning tools to classify images from the Kaggle competition dataset, Cats and Dogs. </a:t>
+            </a:r>
+          </a:p>
+          <a:p>
+            <a:endParaRPr lang="en-US" dirty="0"/>
+          </a:p>
+          <a:p>
+            <a:r>
+              <a:rPr lang="en-US" dirty="0"/>
+              <a:t>For this last phase, the goal was to create a </a:t>
+            </a:r>
+            <a:r>
+              <a:rPr lang="en-US" dirty="0" err="1"/>
+              <a:t>PyTorch</a:t>
+            </a:r>
+            <a:r>
+              <a:rPr lang="en-US" dirty="0"/>
+              <a:t> CNN to classify the images and predict the bounding box locations. We were to use Object-Oriented convolutional neural networks in </a:t>
+            </a:r>
+            <a:r>
+              <a:rPr lang="en-US" dirty="0" err="1"/>
+              <a:t>PyTorch</a:t>
+            </a:r>
+            <a:r>
+              <a:rPr lang="en-US" dirty="0"/>
+              <a:t>.</a:t>
+            </a:r>
+          </a:p>
+          <a:p>
+            <a:endParaRPr lang="en-US" dirty="0"/>
+          </a:p>
+          <a:p>
+            <a:r>
+              <a:rPr lang="en-US" dirty="0"/>
+              <a:t>The main aim is to classify images and predict bounding boxes with the best accuracy possible. Also, documentation of work, with graphs and tabular data are included to display results and communicate methods.</a:t>
+            </a:r>
+          </a:p>
+          <a:p>
+            <a:endParaRPr lang="en-US" dirty="0"/>
+          </a:p>
+          <a:p>
+            <a:r>
+              <a:rPr lang="en-US" dirty="0"/>
+              <a:t>Other aims include gaining experience with Deep Learning techniques and image </a:t>
+            </a:r>
+            <a:r>
+              <a:rPr lang="en-US"/>
+              <a:t>classification tasks.</a:t>
+            </a:r>
+          </a:p>
+        </p:txBody>
+      </p:sp>
     </p:spTree>
     <p:extLst>
       <p:ext uri="{BB962C8B-B14F-4D97-AF65-F5344CB8AC3E}">
@@ -8963,11 +9077,11 @@
   <p:clrMapOvr>
     <a:masterClrMapping/>
   </p:clrMapOvr>
-  <mc:AlternateContent xmlns:mc="http://schemas.openxmlformats.org/markup-compatibility/2006">
-    <mc:Choice xmlns:p14="http://schemas.microsoft.com/office/powerpoint/2010/main" Requires="p14">
+  <mc:AlternateContent xmlns:mc="http://schemas.openxmlformats.org/markup-compatibility/2006" xmlns:p14="http://schemas.microsoft.com/office/powerpoint/2010/main">
+    <mc:Choice Requires="p14">
       <p:transition spd="slow" p14:dur="2000" advTm="4313"/>
     </mc:Choice>
-    <mc:Fallback>
+    <mc:Fallback xmlns="">
       <p:transition spd="slow" advTm="4313"/>
     </mc:Fallback>
   </mc:AlternateContent>
@@ -9035,11 +9149,11 @@
   <p:clrMapOvr>
     <a:masterClrMapping/>
   </p:clrMapOvr>
-  <mc:AlternateContent xmlns:mc="http://schemas.openxmlformats.org/markup-compatibility/2006">
-    <mc:Choice xmlns:p14="http://schemas.microsoft.com/office/powerpoint/2010/main" Requires="p14">
+  <mc:AlternateContent xmlns:mc="http://schemas.openxmlformats.org/markup-compatibility/2006" xmlns:p14="http://schemas.microsoft.com/office/powerpoint/2010/main">
+    <mc:Choice Requires="p14">
       <p:transition spd="slow" p14:dur="2000" advTm="4313"/>
     </mc:Choice>
-    <mc:Fallback>
+    <mc:Fallback xmlns="">
       <p:transition spd="slow" advTm="4313"/>
     </mc:Fallback>
   </mc:AlternateContent>

</xml_diff>

<commit_message>
Make sure Ben's update is in other folder.
</commit_message>
<xml_diff>
--- a/other/Group2_Phase3_final.pptx
+++ b/other/Group2_Phase3_final.pptx
@@ -2921,7 +2921,7 @@
           <a:effectLst/>
           <a:extLst>
             <a:ext uri="{91240B29-F687-4f45-9708-019B960494DF}">
-              <a14:hiddenLine xmlns:a14="http://schemas.microsoft.com/office/drawing/2010/main" xmlns="" w="9525">
+              <a14:hiddenLine xmlns="" xmlns:a14="http://schemas.microsoft.com/office/drawing/2010/main" w="9525">
                 <a:solidFill>
                   <a:srgbClr val="000000"/>
                 </a:solidFill>
@@ -4443,7 +4443,7 @@
           <a:ln/>
           <a:extLst>
             <a:ext uri="{91240B29-F687-4f45-9708-019B960494DF}">
-              <a14:hiddenLine xmlns:a14="http://schemas.microsoft.com/office/drawing/2010/main" xmlns="" w="9525">
+              <a14:hiddenLine xmlns="" xmlns:a14="http://schemas.microsoft.com/office/drawing/2010/main" w="9525">
                 <a:solidFill>
                   <a:srgbClr val="000000"/>
                 </a:solidFill>
@@ -4718,7 +4718,7 @@
           <a:ln/>
           <a:extLst>
             <a:ext uri="{91240B29-F687-4f45-9708-019B960494DF}">
-              <a14:hiddenLine xmlns:a14="http://schemas.microsoft.com/office/drawing/2010/main" xmlns="" w="9525">
+              <a14:hiddenLine xmlns="" xmlns:a14="http://schemas.microsoft.com/office/drawing/2010/main" w="9525">
                 <a:solidFill>
                   <a:srgbClr val="000000"/>
                 </a:solidFill>
@@ -5001,7 +5001,7 @@
           <a:ln/>
           <a:extLst>
             <a:ext uri="{91240B29-F687-4f45-9708-019B960494DF}">
-              <a14:hiddenLine xmlns:a14="http://schemas.microsoft.com/office/drawing/2010/main" xmlns="" w="9525">
+              <a14:hiddenLine xmlns="" xmlns:a14="http://schemas.microsoft.com/office/drawing/2010/main" w="9525">
                 <a:solidFill>
                   <a:srgbClr val="000000"/>
                 </a:solidFill>
@@ -5627,7 +5627,7 @@
           <a:ln/>
           <a:extLst>
             <a:ext uri="{91240B29-F687-4f45-9708-019B960494DF}">
-              <a14:hiddenLine xmlns:a14="http://schemas.microsoft.com/office/drawing/2010/main" xmlns="" w="9525">
+              <a14:hiddenLine xmlns="" xmlns:a14="http://schemas.microsoft.com/office/drawing/2010/main" w="9525">
                 <a:solidFill>
                   <a:srgbClr val="000000"/>
                 </a:solidFill>
@@ -5966,7 +5966,7 @@
           <a:ln/>
           <a:extLst>
             <a:ext uri="{91240B29-F687-4f45-9708-019B960494DF}">
-              <a14:hiddenLine xmlns:a14="http://schemas.microsoft.com/office/drawing/2010/main" xmlns="" w="9525">
+              <a14:hiddenLine xmlns="" xmlns:a14="http://schemas.microsoft.com/office/drawing/2010/main" w="9525">
                 <a:solidFill>
                   <a:srgbClr val="000000"/>
                 </a:solidFill>
@@ -6443,7 +6443,7 @@
           <a:ln/>
           <a:extLst>
             <a:ext uri="{91240B29-F687-4f45-9708-019B960494DF}">
-              <a14:hiddenLine xmlns:a14="http://schemas.microsoft.com/office/drawing/2010/main" xmlns="" w="9525">
+              <a14:hiddenLine xmlns="" xmlns:a14="http://schemas.microsoft.com/office/drawing/2010/main" w="9525">
                 <a:solidFill>
                   <a:srgbClr val="000000"/>
                 </a:solidFill>
@@ -6872,7 +6872,7 @@
           <a:ln/>
           <a:extLst>
             <a:ext uri="{91240B29-F687-4f45-9708-019B960494DF}">
-              <a14:hiddenLine xmlns:a14="http://schemas.microsoft.com/office/drawing/2010/main" xmlns="" w="9525">
+              <a14:hiddenLine xmlns="" xmlns:a14="http://schemas.microsoft.com/office/drawing/2010/main" w="9525">
                 <a:solidFill>
                   <a:srgbClr val="000000"/>
                 </a:solidFill>

</xml_diff>

<commit_message>
Ben add Purpose slide text
</commit_message>
<xml_diff>
--- a/other/Group2_Phase3_final.pptx
+++ b/other/Group2_Phase3_final.pptx
@@ -2921,7 +2921,7 @@
           <a:effectLst/>
           <a:extLst>
             <a:ext uri="{91240B29-F687-4f45-9708-019B960494DF}">
-              <a14:hiddenLine xmlns="" xmlns:a14="http://schemas.microsoft.com/office/drawing/2010/main" w="9525">
+              <a14:hiddenLine xmlns:a14="http://schemas.microsoft.com/office/drawing/2010/main" xmlns="" w="9525">
                 <a:solidFill>
                   <a:srgbClr val="000000"/>
                 </a:solidFill>
@@ -4443,7 +4443,7 @@
           <a:ln/>
           <a:extLst>
             <a:ext uri="{91240B29-F687-4f45-9708-019B960494DF}">
-              <a14:hiddenLine xmlns="" xmlns:a14="http://schemas.microsoft.com/office/drawing/2010/main" w="9525">
+              <a14:hiddenLine xmlns:a14="http://schemas.microsoft.com/office/drawing/2010/main" xmlns="" w="9525">
                 <a:solidFill>
                   <a:srgbClr val="000000"/>
                 </a:solidFill>
@@ -4718,7 +4718,7 @@
           <a:ln/>
           <a:extLst>
             <a:ext uri="{91240B29-F687-4f45-9708-019B960494DF}">
-              <a14:hiddenLine xmlns="" xmlns:a14="http://schemas.microsoft.com/office/drawing/2010/main" w="9525">
+              <a14:hiddenLine xmlns:a14="http://schemas.microsoft.com/office/drawing/2010/main" xmlns="" w="9525">
                 <a:solidFill>
                   <a:srgbClr val="000000"/>
                 </a:solidFill>
@@ -5001,7 +5001,7 @@
           <a:ln/>
           <a:extLst>
             <a:ext uri="{91240B29-F687-4f45-9708-019B960494DF}">
-              <a14:hiddenLine xmlns="" xmlns:a14="http://schemas.microsoft.com/office/drawing/2010/main" w="9525">
+              <a14:hiddenLine xmlns:a14="http://schemas.microsoft.com/office/drawing/2010/main" xmlns="" w="9525">
                 <a:solidFill>
                   <a:srgbClr val="000000"/>
                 </a:solidFill>
@@ -5627,7 +5627,7 @@
           <a:ln/>
           <a:extLst>
             <a:ext uri="{91240B29-F687-4f45-9708-019B960494DF}">
-              <a14:hiddenLine xmlns="" xmlns:a14="http://schemas.microsoft.com/office/drawing/2010/main" w="9525">
+              <a14:hiddenLine xmlns:a14="http://schemas.microsoft.com/office/drawing/2010/main" xmlns="" w="9525">
                 <a:solidFill>
                   <a:srgbClr val="000000"/>
                 </a:solidFill>
@@ -5966,7 +5966,7 @@
           <a:ln/>
           <a:extLst>
             <a:ext uri="{91240B29-F687-4f45-9708-019B960494DF}">
-              <a14:hiddenLine xmlns="" xmlns:a14="http://schemas.microsoft.com/office/drawing/2010/main" w="9525">
+              <a14:hiddenLine xmlns:a14="http://schemas.microsoft.com/office/drawing/2010/main" xmlns="" w="9525">
                 <a:solidFill>
                   <a:srgbClr val="000000"/>
                 </a:solidFill>
@@ -6443,7 +6443,7 @@
           <a:ln/>
           <a:extLst>
             <a:ext uri="{91240B29-F687-4f45-9708-019B960494DF}">
-              <a14:hiddenLine xmlns="" xmlns:a14="http://schemas.microsoft.com/office/drawing/2010/main" w="9525">
+              <a14:hiddenLine xmlns:a14="http://schemas.microsoft.com/office/drawing/2010/main" xmlns="" w="9525">
                 <a:solidFill>
                   <a:srgbClr val="000000"/>
                 </a:solidFill>
@@ -6872,7 +6872,7 @@
           <a:ln/>
           <a:extLst>
             <a:ext uri="{91240B29-F687-4f45-9708-019B960494DF}">
-              <a14:hiddenLine xmlns="" xmlns:a14="http://schemas.microsoft.com/office/drawing/2010/main" w="9525">
+              <a14:hiddenLine xmlns:a14="http://schemas.microsoft.com/office/drawing/2010/main" xmlns="" w="9525">
                 <a:solidFill>
                   <a:srgbClr val="000000"/>
                 </a:solidFill>

</xml_diff>

<commit_message>
Added project activities text (slide 5)
</commit_message>
<xml_diff>
--- a/other/Group2_Phase3_final.pptx
+++ b/other/Group2_Phase3_final.pptx
@@ -1895,103 +1895,7 @@
                 <a:ea typeface="+mn-ea"/>
                 <a:cs typeface="+mn-cs"/>
               </a:rPr>
-              <a:t>This criterion is linked to a Learning Outcome</a:t>
-            </a:r>
-          </a:p>
-          <a:p>
-            <a:pPr marL="0" marR="0" lvl="0" indent="0" algn="l" defTabSz="914400" rtl="0" eaLnBrk="1" fontAlgn="auto" latinLnBrk="0" hangingPunct="1">
-              <a:lnSpc>
-                <a:spcPct val="100000"/>
-              </a:lnSpc>
-              <a:spcBef>
-                <a:spcPts val="0"/>
-              </a:spcBef>
-              <a:spcAft>
-                <a:spcPts val="0"/>
-              </a:spcAft>
-              <a:buClrTx/>
-              <a:buSzTx/>
-              <a:buFontTx/>
-              <a:buNone/>
-              <a:tabLst/>
-              <a:defRPr/>
-            </a:pPr>
-            <a:r>
-              <a:rPr lang="en-US" sz="1200" b="0" i="0" kern="1200" dirty="0">
-                <a:solidFill>
-                  <a:schemeClr val="tx1"/>
-                </a:solidFill>
-                <a:effectLst/>
-                <a:latin typeface="+mn-lt"/>
-                <a:ea typeface="+mn-ea"/>
-                <a:cs typeface="+mn-cs"/>
-              </a:rPr>
-              <a:t>Results and discussion of results</a:t>
-            </a:r>
-          </a:p>
-          <a:p>
-            <a:pPr marL="0" marR="0" lvl="0" indent="0" algn="l" defTabSz="914400" rtl="0" eaLnBrk="1" fontAlgn="auto" latinLnBrk="0" hangingPunct="1">
-              <a:lnSpc>
-                <a:spcPct val="100000"/>
-              </a:lnSpc>
-              <a:spcBef>
-                <a:spcPts val="0"/>
-              </a:spcBef>
-              <a:spcAft>
-                <a:spcPts val="0"/>
-              </a:spcAft>
-              <a:buClrTx/>
-              <a:buSzTx/>
-              <a:buFontTx/>
-              <a:buNone/>
-              <a:tabLst/>
-              <a:defRPr/>
-            </a:pPr>
-            <a:r>
-              <a:rPr lang="en-US" sz="1200" b="0" i="0" kern="1200" dirty="0">
-                <a:solidFill>
-                  <a:schemeClr val="tx1"/>
-                </a:solidFill>
-                <a:effectLst/>
-                <a:latin typeface="+mn-lt"/>
-                <a:ea typeface="+mn-ea"/>
-                <a:cs typeface="+mn-cs"/>
-              </a:rPr>
-              <a:t>Expectations here are to provide the following in sections and subsections:</a:t>
-            </a:r>
-            <a:br>
-              <a:rPr lang="en-US" sz="1200" b="0" i="0" kern="1200" dirty="0">
-                <a:solidFill>
-                  <a:schemeClr val="tx1"/>
-                </a:solidFill>
-                <a:effectLst/>
-                <a:latin typeface="+mn-lt"/>
-                <a:ea typeface="+mn-ea"/>
-                <a:cs typeface="+mn-cs"/>
-              </a:rPr>
-            </a:br>
-            <a:br>
-              <a:rPr lang="en-US" sz="1200" b="0" i="0" kern="1200" dirty="0">
-                <a:solidFill>
-                  <a:schemeClr val="tx1"/>
-                </a:solidFill>
-                <a:effectLst/>
-                <a:latin typeface="+mn-lt"/>
-                <a:ea typeface="+mn-ea"/>
-                <a:cs typeface="+mn-cs"/>
-              </a:rPr>
-            </a:br>
-            <a:r>
-              <a:rPr lang="en-US" sz="1200" b="0" i="0" kern="1200" dirty="0">
-                <a:solidFill>
-                  <a:schemeClr val="tx1"/>
-                </a:solidFill>
-                <a:effectLst/>
-                <a:latin typeface="+mn-lt"/>
-                <a:ea typeface="+mn-ea"/>
-                <a:cs typeface="+mn-cs"/>
-              </a:rPr>
-              <a:t>Discussion’s aim is result interpretation, which means explain, </a:t>
+              <a:t>Our project had three phases, in which we imported, examined data, resized and transformed it, performed feature engineering and compared models using </a:t>
             </a:r>
             <a:r>
               <a:rPr lang="en-US" sz="1200" b="0" i="0" kern="1200" dirty="0" err="1">
@@ -2003,22 +1907,68 @@
                 <a:ea typeface="+mn-ea"/>
                 <a:cs typeface="+mn-cs"/>
               </a:rPr>
-              <a:t>analyse</a:t>
-            </a:r>
-            <a:r>
-              <a:rPr lang="en-US" sz="1200" b="0" i="0" kern="1200" dirty="0">
-                <a:solidFill>
-                  <a:schemeClr val="tx1"/>
-                </a:solidFill>
-                <a:effectLst/>
-                <a:latin typeface="+mn-lt"/>
-                <a:ea typeface="+mn-ea"/>
-                <a:cs typeface="+mn-cs"/>
-              </a:rPr>
-              <a:t>, and compare them. Often, this part is the most important, simply because it lets the researcher take a step back and give a broader look at the experiment. Do not discuss any outcomes not presented in the results part.</a:t>
-            </a:r>
-          </a:p>
-          <a:p>
+              <a:t>crossfold</a:t>
+            </a:r>
+            <a:r>
+              <a:rPr lang="en-US" sz="1200" b="0" i="0" kern="1200" dirty="0">
+                <a:solidFill>
+                  <a:schemeClr val="tx1"/>
+                </a:solidFill>
+                <a:effectLst/>
+                <a:latin typeface="+mn-lt"/>
+                <a:ea typeface="+mn-ea"/>
+                <a:cs typeface="+mn-cs"/>
+              </a:rPr>
+              <a:t> validation. We trained linear and logistic regression prediction models with gradient descent and then used </a:t>
+            </a:r>
+            <a:r>
+              <a:rPr lang="en-US" sz="1200" b="0" i="0" kern="1200" dirty="0" err="1">
+                <a:solidFill>
+                  <a:schemeClr val="tx1"/>
+                </a:solidFill>
+                <a:effectLst/>
+                <a:latin typeface="+mn-lt"/>
+                <a:ea typeface="+mn-ea"/>
+                <a:cs typeface="+mn-cs"/>
+              </a:rPr>
+              <a:t>Pytorch</a:t>
+            </a:r>
+            <a:r>
+              <a:rPr lang="en-US" sz="1200" b="0" i="0" kern="1200" dirty="0">
+                <a:solidFill>
+                  <a:schemeClr val="tx1"/>
+                </a:solidFill>
+                <a:effectLst/>
+                <a:latin typeface="+mn-lt"/>
+                <a:ea typeface="+mn-ea"/>
+                <a:cs typeface="+mn-cs"/>
+              </a:rPr>
+              <a:t> and tensors to build linear and convolutional neural network models running on Google </a:t>
+            </a:r>
+            <a:r>
+              <a:rPr lang="en-US" sz="1200" b="0" i="0" kern="1200" dirty="0" err="1">
+                <a:solidFill>
+                  <a:schemeClr val="tx1"/>
+                </a:solidFill>
+                <a:effectLst/>
+                <a:latin typeface="+mn-lt"/>
+                <a:ea typeface="+mn-ea"/>
+                <a:cs typeface="+mn-cs"/>
+              </a:rPr>
+              <a:t>Colab’s</a:t>
+            </a:r>
+            <a:r>
+              <a:rPr lang="en-US" sz="1200" b="0" i="0" kern="1200" dirty="0">
+                <a:solidFill>
+                  <a:schemeClr val="tx1"/>
+                </a:solidFill>
+                <a:effectLst/>
+                <a:latin typeface="+mn-lt"/>
+                <a:ea typeface="+mn-ea"/>
+                <a:cs typeface="+mn-cs"/>
+              </a:rPr>
+              <a:t> GPU. With additional time we would have added a pretrained model and adjusted for accuracy.</a:t>
+            </a:r>
             <a:endParaRPr lang="en-US" dirty="0"/>
           </a:p>
         </p:txBody>
@@ -8914,11 +8864,7 @@
           <a:p>
             <a:r>
               <a:rPr lang="en-US" dirty="0"/>
-              <a:t>Other aims include gaining experience with Deep Learning techniques and image </a:t>
-            </a:r>
-            <a:r>
-              <a:rPr lang="en-US"/>
-              <a:t>classification tasks.</a:t>
+              <a:t>Other aims include gaining experience with Deep Learning techniques and image classification tasks.</a:t>
             </a:r>
           </a:p>
         </p:txBody>
@@ -8979,7 +8925,7 @@
         </p:nvSpPr>
         <p:spPr>
           <a:xfrm>
-            <a:off x="179953" y="467075"/>
+            <a:off x="515102" y="77503"/>
             <a:ext cx="10571998" cy="970450"/>
           </a:xfrm>
         </p:spPr>
@@ -8992,6 +8938,165 @@
               <a:t>Project activities – What?</a:t>
             </a:r>
             <a:endParaRPr lang="en-US" sz="2400" dirty="0"/>
+          </a:p>
+        </p:txBody>
+      </p:sp>
+      <p:sp>
+        <p:nvSpPr>
+          <p:cNvPr id="5" name="TextBox 4">
+            <a:extLst>
+              <a:ext uri="{FF2B5EF4-FFF2-40B4-BE49-F238E27FC236}">
+                <a16:creationId xmlns:a16="http://schemas.microsoft.com/office/drawing/2014/main" id="{9D78591B-0BA7-6448-ABFA-24E1D2183457}"/>
+              </a:ext>
+            </a:extLst>
+          </p:cNvPr>
+          <p:cNvSpPr txBox="1"/>
+          <p:nvPr/>
+        </p:nvSpPr>
+        <p:spPr>
+          <a:xfrm>
+            <a:off x="693420" y="2141882"/>
+            <a:ext cx="10805160" cy="4524315"/>
+          </a:xfrm>
+          <a:prstGeom prst="rect">
+            <a:avLst/>
+          </a:prstGeom>
+          <a:noFill/>
+        </p:spPr>
+        <p:txBody>
+          <a:bodyPr wrap="square" rtlCol="0">
+            <a:spAutoFit/>
+          </a:bodyPr>
+          <a:lstStyle/>
+          <a:p>
+            <a:r>
+              <a:rPr lang="en-US" sz="1600" dirty="0"/>
+              <a:t>During Phase 1, we imported data and performed exploratory data analysis using </a:t>
+            </a:r>
+            <a:r>
+              <a:rPr lang="en-US" sz="1600" dirty="0" err="1"/>
+              <a:t>numpy</a:t>
+            </a:r>
+            <a:r>
+              <a:rPr lang="en-US" sz="1600" dirty="0"/>
+              <a:t>, pandas, and by plotting image metadata, bounding boxes, and ground truth data. </a:t>
+            </a:r>
+          </a:p>
+          <a:p>
+            <a:endParaRPr lang="en-US" sz="1600" dirty="0"/>
+          </a:p>
+          <a:p>
+            <a:r>
+              <a:rPr lang="en-US" sz="1600" dirty="0"/>
+              <a:t>We plotted </a:t>
+            </a:r>
+            <a:r>
+              <a:rPr lang="en-US" sz="1600" dirty="0" err="1"/>
+              <a:t>XClick</a:t>
+            </a:r>
+            <a:r>
+              <a:rPr lang="en-US" sz="1600" dirty="0"/>
+              <a:t> points to understand correlation and engineered new features based on bounding box points and normalized images by resizing to 128 by 128 and flattening to </a:t>
+            </a:r>
+            <a:r>
+              <a:rPr lang="en-US" sz="1600" dirty="0" err="1"/>
+              <a:t>numpy</a:t>
+            </a:r>
+            <a:r>
+              <a:rPr lang="en-US" sz="1600" dirty="0"/>
+              <a:t> arrays.  </a:t>
+            </a:r>
+          </a:p>
+          <a:p>
+            <a:endParaRPr lang="en-US" sz="1600" dirty="0"/>
+          </a:p>
+          <a:p>
+            <a:r>
+              <a:rPr lang="en-US" sz="1600" dirty="0"/>
+              <a:t>Several bounding box prediction models and hyperparameters were tested with </a:t>
+            </a:r>
+            <a:r>
+              <a:rPr lang="en-US" sz="1600" dirty="0" err="1"/>
+              <a:t>GridSearch</a:t>
+            </a:r>
+            <a:r>
+              <a:rPr lang="en-US" sz="1600" dirty="0"/>
+              <a:t> </a:t>
+            </a:r>
+            <a:r>
+              <a:rPr lang="en-US" sz="1600" dirty="0" err="1"/>
+              <a:t>crossfold</a:t>
+            </a:r>
+            <a:r>
+              <a:rPr lang="en-US" sz="1600" dirty="0"/>
+              <a:t> validation, and we tested an </a:t>
+            </a:r>
+            <a:r>
+              <a:rPr lang="en-US" sz="1600" dirty="0" err="1"/>
+              <a:t>SKLearn</a:t>
+            </a:r>
+            <a:r>
+              <a:rPr lang="en-US" sz="1600" dirty="0"/>
+              <a:t> Logistic Regression model as well as a homegrown Logistic Regression model trained with gradient descent.</a:t>
+            </a:r>
+          </a:p>
+          <a:p>
+            <a:endParaRPr lang="en-US" sz="1600" dirty="0"/>
+          </a:p>
+          <a:p>
+            <a:r>
+              <a:rPr lang="en-US" sz="1600" dirty="0"/>
+              <a:t>In Phase 2, we explored several neural network models built with </a:t>
+            </a:r>
+            <a:r>
+              <a:rPr lang="en-US" sz="1600" dirty="0" err="1"/>
+              <a:t>PyTorch</a:t>
+            </a:r>
+            <a:r>
+              <a:rPr lang="en-US" sz="1600" dirty="0"/>
+              <a:t> and transformed image </a:t>
+            </a:r>
+            <a:r>
+              <a:rPr lang="en-US" sz="1600" dirty="0" err="1"/>
+              <a:t>numpy</a:t>
+            </a:r>
+            <a:r>
+              <a:rPr lang="en-US" sz="1600" dirty="0"/>
+              <a:t> arrays to greyscale resized Tensors, and trained a simple linear neural net model with an accuracy of 53%.  A classification-only model (</a:t>
+            </a:r>
+            <a:r>
+              <a:rPr lang="en-US" sz="1600" dirty="0" err="1"/>
+              <a:t>FrankenNet</a:t>
+            </a:r>
+            <a:r>
+              <a:rPr lang="en-US" sz="1600" dirty="0"/>
+              <a:t>)was trained with 95% accuracy and tested at 72% accuracy.</a:t>
+            </a:r>
+          </a:p>
+          <a:p>
+            <a:endParaRPr lang="en-US" sz="1600" dirty="0"/>
+          </a:p>
+          <a:p>
+            <a:r>
+              <a:rPr lang="en-US" sz="1600" dirty="0"/>
+              <a:t>In Phase 3, we intended on adding bounding box prediction to </a:t>
+            </a:r>
+            <a:r>
+              <a:rPr lang="en-US" sz="1600" dirty="0" err="1"/>
+              <a:t>FrankenNet</a:t>
+            </a:r>
+            <a:r>
+              <a:rPr lang="en-US" sz="1600" dirty="0"/>
+              <a:t>, but did not have time to finish configuring it with Google </a:t>
+            </a:r>
+            <a:r>
+              <a:rPr lang="en-US" sz="1600" dirty="0" err="1"/>
+              <a:t>Colab’s</a:t>
+            </a:r>
+            <a:r>
+              <a:rPr lang="en-US" sz="1600" dirty="0"/>
+              <a:t> GPU runtime. We trained a different Conv2d model based on Group 4’s Phase 2 model with an accuracy of 54% before exhausting our project time.  Given the time, we would have added a pretrained neural network model like ResNet18 and tuned our model’s accuracy.</a:t>
+            </a:r>
           </a:p>
         </p:txBody>
       </p:sp>

</xml_diff>